<commit_message>
added an alter table informational line to the presentation
</commit_message>
<xml_diff>
--- a/checkers/fianl.pptx
+++ b/checkers/fianl.pptx
@@ -113,6 +113,11 @@
       </a:defRPr>
     </a:lvl9pPr>
   </p:defaultTextStyle>
+  <p:extLst>
+    <p:ext uri="{EFAFB233-063F-42B5-8137-9DF3F51BA10A}">
+      <p15:sldGuideLst xmlns:p15="http://schemas.microsoft.com/office/powerpoint/2012/main"/>
+    </p:ext>
+  </p:extLst>
 </p:presentation>
 </file>
 
@@ -20045,8 +20050,8 @@
         </p:nvSpPr>
         <p:spPr>
           <a:xfrm>
-            <a:off x="1600200" y="4343400"/>
-            <a:ext cx="1828800" cy="457200"/>
+            <a:off x="1600199" y="4343400"/>
+            <a:ext cx="2119923" cy="457200"/>
           </a:xfrm>
           <a:prstGeom prst="flowChartMagneticDisk">
             <a:avLst/>
@@ -20087,7 +20092,7 @@
               </a:lnSpc>
             </a:pPr>
             <a:r>
-              <a:rPr lang="en-US" sz="2400" b="0" strike="noStrike" spc="-1">
+              <a:rPr lang="en-US" sz="2400" b="0" strike="noStrike" spc="-1" dirty="0">
                 <a:solidFill>
                   <a:srgbClr val="000000"/>
                 </a:solidFill>
@@ -20096,7 +20101,7 @@
               </a:rPr>
               <a:t>DB</a:t>
             </a:r>
-            <a:endParaRPr lang="en-US" sz="2400" b="0" strike="noStrike" spc="-1">
+            <a:endParaRPr lang="en-US" sz="2400" b="0" strike="noStrike" spc="-1" dirty="0">
               <a:latin typeface="Arial"/>
             </a:endParaRPr>
           </a:p>
@@ -20208,7 +20213,7 @@
               <a:buNone/>
             </a:pPr>
             <a:r>
-              <a:rPr lang="en-US" sz="3300" b="0" strike="noStrike" spc="-1">
+              <a:rPr lang="en-US" sz="3300" b="0" strike="noStrike" spc="-1" dirty="0">
                 <a:latin typeface="Arial"/>
               </a:rPr>
               <a:t>Database</a:t>
@@ -20228,8 +20233,8 @@
         </p:nvSpPr>
         <p:spPr>
           <a:xfrm>
-            <a:off x="504000" y="1326600"/>
-            <a:ext cx="9071640" cy="3288240"/>
+            <a:off x="62524" y="1172520"/>
+            <a:ext cx="6010030" cy="3442321"/>
           </a:xfrm>
           <a:prstGeom prst="rect">
             <a:avLst/>
@@ -20241,7 +20246,7 @@
         </p:spPr>
         <p:txBody>
           <a:bodyPr lIns="0" tIns="0" rIns="0" bIns="0" anchor="t">
-            <a:normAutofit/>
+            <a:normAutofit lnSpcReduction="10000"/>
           </a:bodyPr>
           <a:lstStyle/>
           <a:p>
@@ -20272,7 +20277,7 @@
               <a:rPr lang="en-US" sz="2400" b="0" strike="noStrike" spc="-1" dirty="0">
                 <a:latin typeface="Arial"/>
               </a:rPr>
-              <a:t> </a:t>
+              <a:t> via Hibernate JPA</a:t>
             </a:r>
           </a:p>
           <a:p>
@@ -20291,8 +20296,110 @@
               <a:rPr lang="en-US" sz="2400" b="0" strike="noStrike" spc="-1" dirty="0">
                 <a:latin typeface="Arial"/>
               </a:rPr>
-              <a:t>via Hibernate JPA</a:t>
+              <a:t>Every time the table is dropped:</a:t>
             </a:r>
+          </a:p>
+          <a:p>
+            <a:pPr marL="432000" indent="-324000">
+              <a:spcAft>
+                <a:spcPts val="1060"/>
+              </a:spcAft>
+              <a:buClr>
+                <a:srgbClr val="000000"/>
+              </a:buClr>
+              <a:buSzPct val="45000"/>
+              <a:buFont typeface="Wingdings" charset="2"/>
+              <a:buChar char=""/>
+            </a:pPr>
+            <a:r>
+              <a:rPr lang="en-US" sz="2400" b="0" strike="noStrike" spc="-1" dirty="0">
+                <a:latin typeface="Arial"/>
+              </a:rPr>
+              <a:t>“ALTER TABLE states MODIFY </a:t>
+            </a:r>
+            <a:r>
+              <a:rPr lang="en-US" sz="2400" b="0" strike="noStrike" spc="-1" dirty="0" err="1">
+                <a:latin typeface="Arial"/>
+              </a:rPr>
+              <a:t>current_state</a:t>
+            </a:r>
+            <a:r>
+              <a:rPr lang="en-US" sz="2400" b="0" strike="noStrike" spc="-1" dirty="0">
+                <a:latin typeface="Arial"/>
+              </a:rPr>
+              <a:t> LONGBLOB;”</a:t>
+            </a:r>
+          </a:p>
+          <a:p>
+            <a:pPr marL="108000">
+              <a:spcAft>
+                <a:spcPts val="1060"/>
+              </a:spcAft>
+              <a:buClr>
+                <a:srgbClr val="000000"/>
+              </a:buClr>
+              <a:buSzPct val="45000"/>
+            </a:pPr>
+            <a:r>
+              <a:rPr lang="en-US" sz="2400" spc="-1" dirty="0">
+                <a:latin typeface="Arial"/>
+              </a:rPr>
+              <a:t>-since the data type of `current_state`</a:t>
+            </a:r>
+          </a:p>
+          <a:p>
+            <a:pPr marL="108000">
+              <a:spcAft>
+                <a:spcPts val="1060"/>
+              </a:spcAft>
+              <a:buClr>
+                <a:srgbClr val="000000"/>
+              </a:buClr>
+              <a:buSzPct val="45000"/>
+            </a:pPr>
+            <a:r>
+              <a:rPr lang="en-US" sz="2400" spc="-1" dirty="0">
+                <a:latin typeface="Arial"/>
+              </a:rPr>
+              <a:t>is a matrix of Piece (Piece[][])</a:t>
+            </a:r>
+          </a:p>
+          <a:p>
+            <a:pPr marL="108000">
+              <a:spcAft>
+                <a:spcPts val="1060"/>
+              </a:spcAft>
+              <a:buClr>
+                <a:srgbClr val="000000"/>
+              </a:buClr>
+              <a:buSzPct val="45000"/>
+            </a:pPr>
+            <a:r>
+              <a:rPr lang="en-US" sz="2400" spc="-1" dirty="0">
+                <a:latin typeface="Arial"/>
+              </a:rPr>
+              <a:t>which is represented by blob and</a:t>
+            </a:r>
+          </a:p>
+          <a:p>
+            <a:pPr marL="108000">
+              <a:spcAft>
+                <a:spcPts val="1060"/>
+              </a:spcAft>
+              <a:buClr>
+                <a:srgbClr val="000000"/>
+              </a:buClr>
+              <a:buSzPct val="45000"/>
+            </a:pPr>
+            <a:r>
+              <a:rPr lang="en-US" sz="2400" spc="-1" dirty="0">
+                <a:latin typeface="Arial"/>
+              </a:rPr>
+              <a:t>It’s way too small for the input </a:t>
+            </a:r>
+            <a:endParaRPr lang="en-US" sz="2400" b="0" strike="noStrike" spc="-1" dirty="0">
+              <a:latin typeface="Arial"/>
+            </a:endParaRPr>
           </a:p>
         </p:txBody>
       </p:sp>
@@ -20318,8 +20425,8 @@
         </p:blipFill>
         <p:spPr>
           <a:xfrm>
-            <a:off x="4108162" y="1080398"/>
-            <a:ext cx="5248647" cy="3534442"/>
+            <a:off x="5258488" y="1172520"/>
+            <a:ext cx="4758628" cy="3244897"/>
           </a:xfrm>
           <a:prstGeom prst="rect">
             <a:avLst/>

</xml_diff>